<commit_message>
Can now change fps during ingest into Pravega. Updated safety and security notebooks.
Signed-off-by: Claudio Fahey <claudio.fahey@dell.com>
</commit_message>
<xml_diff>
--- a/images/video-samples-diagram.pptx
+++ b/images/video-samples-diagram.pptx
@@ -5,10 +5,11 @@
     <p:sldMasterId id="2147483660" r:id="rId1"/>
   </p:sldMasterIdLst>
   <p:notesMasterIdLst>
-    <p:notesMasterId r:id="rId3"/>
+    <p:notesMasterId r:id="rId4"/>
   </p:notesMasterIdLst>
   <p:sldIdLst>
     <p:sldId id="994" r:id="rId2"/>
+    <p:sldId id="995" r:id="rId3"/>
   </p:sldIdLst>
   <p:sldSz cx="12192000" cy="6858000"/>
   <p:notesSz cx="6858000" cy="9144000"/>
@@ -107,6 +108,11 @@
       </a:defRPr>
     </a:lvl9pPr>
   </p:defaultTextStyle>
+  <p:extLst>
+    <p:ext uri="{EFAFB233-063F-42B5-8137-9DF3F51BA10A}">
+      <p15:sldGuideLst xmlns:p15="http://schemas.microsoft.com/office/powerpoint/2012/main"/>
+    </p:ext>
+  </p:extLst>
 </p:presentation>
 </file>
 
@@ -192,7 +198,7 @@
           <a:p>
             <a:fld id="{50E0202F-5CB4-4F95-BE9B-85761ECE5580}" type="datetimeFigureOut">
               <a:rPr lang="en-US" smtClean="0"/>
-              <a:t>9/10/2019</a:t>
+              <a:t>4/9/2020</a:t>
             </a:fld>
             <a:endParaRPr lang="en-US"/>
           </a:p>
@@ -587,6 +593,143 @@
     <p:extLst>
       <p:ext uri="{BB962C8B-B14F-4D97-AF65-F5344CB8AC3E}">
         <p14:creationId xmlns:p14="http://schemas.microsoft.com/office/powerpoint/2010/main" val="2172919893"/>
+      </p:ext>
+    </p:extLst>
+  </p:cSld>
+  <p:clrMapOvr>
+    <a:masterClrMapping/>
+  </p:clrMapOvr>
+</p:notes>
+</file>
+
+<file path=ppt/notesSlides/notesSlide2.xml><?xml version="1.0" encoding="utf-8"?>
+<p:notes xmlns:a="http://schemas.openxmlformats.org/drawingml/2006/main" xmlns:r="http://schemas.openxmlformats.org/officeDocument/2006/relationships" xmlns:p="http://schemas.openxmlformats.org/presentationml/2006/main">
+  <p:cSld>
+    <p:spTree>
+      <p:nvGrpSpPr>
+        <p:cNvPr id="1" name=""/>
+        <p:cNvGrpSpPr/>
+        <p:nvPr/>
+      </p:nvGrpSpPr>
+      <p:grpSpPr>
+        <a:xfrm>
+          <a:off x="0" y="0"/>
+          <a:ext cx="0" cy="0"/>
+          <a:chOff x="0" y="0"/>
+          <a:chExt cx="0" cy="0"/>
+        </a:xfrm>
+      </p:grpSpPr>
+      <p:sp>
+        <p:nvSpPr>
+          <p:cNvPr id="2" name="Slide Image Placeholder 1"/>
+          <p:cNvSpPr>
+            <a:spLocks noGrp="1" noRot="1" noChangeAspect="1"/>
+          </p:cNvSpPr>
+          <p:nvPr>
+            <p:ph type="sldImg"/>
+          </p:nvPr>
+        </p:nvSpPr>
+        <p:spPr/>
+      </p:sp>
+      <p:sp>
+        <p:nvSpPr>
+          <p:cNvPr id="3" name="Notes Placeholder 2"/>
+          <p:cNvSpPr>
+            <a:spLocks noGrp="1"/>
+          </p:cNvSpPr>
+          <p:nvPr>
+            <p:ph type="body" idx="1"/>
+          </p:nvPr>
+        </p:nvSpPr>
+        <p:spPr/>
+        <p:txBody>
+          <a:bodyPr/>
+          <a:lstStyle/>
+          <a:p>
+            <a:r>
+              <a:rPr lang="en-US" dirty="0"/>
+              <a:t>Camera Recorder</a:t>
+            </a:r>
+          </a:p>
+          <a:p>
+            <a:pPr lvl="1"/>
+            <a:r>
+              <a:rPr lang="en-US" dirty="0"/>
+              <a:t>non-</a:t>
+            </a:r>
+            <a:r>
+              <a:rPr lang="en-US" dirty="0" err="1"/>
+              <a:t>Flink</a:t>
+            </a:r>
+            <a:r>
+              <a:rPr lang="en-US" dirty="0"/>
+              <a:t> application that reads frames from a video camera and writes to Pravega</a:t>
+            </a:r>
+          </a:p>
+          <a:p>
+            <a:r>
+              <a:rPr lang="en-US" dirty="0"/>
+              <a:t>Video Data Generator Job</a:t>
+            </a:r>
+          </a:p>
+          <a:p>
+            <a:pPr lvl="1"/>
+            <a:r>
+              <a:rPr lang="en-US" dirty="0" err="1"/>
+              <a:t>Flink</a:t>
+            </a:r>
+            <a:r>
+              <a:rPr lang="en-US" dirty="0"/>
+              <a:t> application that simulates additional cameras and writes to Pravega</a:t>
+            </a:r>
+          </a:p>
+          <a:p>
+            <a:r>
+              <a:rPr lang="en-US" dirty="0"/>
+              <a:t>Multi-Video Grid Job</a:t>
+            </a:r>
+          </a:p>
+          <a:p>
+            <a:pPr lvl="1"/>
+            <a:r>
+              <a:rPr lang="en-US" dirty="0" err="1"/>
+              <a:t>Flink</a:t>
+            </a:r>
+            <a:r>
+              <a:rPr lang="en-US" dirty="0"/>
+              <a:t> application that combines multiple camera feeds into a single feed</a:t>
+            </a:r>
+          </a:p>
+          <a:p>
+            <a:r>
+              <a:rPr lang="en-US" dirty="0"/>
+              <a:t>Video Player</a:t>
+            </a:r>
+          </a:p>
+          <a:p>
+            <a:pPr lvl="1"/>
+            <a:r>
+              <a:rPr lang="en-US" dirty="0"/>
+              <a:t>Non-</a:t>
+            </a:r>
+            <a:r>
+              <a:rPr lang="en-US" dirty="0" err="1"/>
+              <a:t>Flink</a:t>
+            </a:r>
+            <a:r>
+              <a:rPr lang="en-US" dirty="0"/>
+              <a:t> application that reads video from a Pravega stream and displays it on the screen</a:t>
+            </a:r>
+          </a:p>
+          <a:p>
+            <a:endParaRPr lang="en-US" dirty="0"/>
+          </a:p>
+        </p:txBody>
+      </p:sp>
+    </p:spTree>
+    <p:extLst>
+      <p:ext uri="{BB962C8B-B14F-4D97-AF65-F5344CB8AC3E}">
+        <p14:creationId xmlns:p14="http://schemas.microsoft.com/office/powerpoint/2010/main" val="683023223"/>
       </p:ext>
     </p:extLst>
   </p:cSld>
@@ -6595,6 +6738,1206 @@
     <p:extLst>
       <p:ext uri="{BB962C8B-B14F-4D97-AF65-F5344CB8AC3E}">
         <p14:creationId xmlns:p14="http://schemas.microsoft.com/office/powerpoint/2010/main" val="2772639083"/>
+      </p:ext>
+    </p:extLst>
+  </p:cSld>
+  <p:clrMapOvr>
+    <a:masterClrMapping/>
+  </p:clrMapOvr>
+</p:sld>
+</file>
+
+<file path=ppt/slides/slide2.xml><?xml version="1.0" encoding="utf-8"?>
+<p:sld xmlns:a="http://schemas.openxmlformats.org/drawingml/2006/main" xmlns:r="http://schemas.openxmlformats.org/officeDocument/2006/relationships" xmlns:p="http://schemas.openxmlformats.org/presentationml/2006/main">
+  <p:cSld>
+    <p:spTree>
+      <p:nvGrpSpPr>
+        <p:cNvPr id="1" name=""/>
+        <p:cNvGrpSpPr/>
+        <p:nvPr/>
+      </p:nvGrpSpPr>
+      <p:grpSpPr>
+        <a:xfrm>
+          <a:off x="0" y="0"/>
+          <a:ext cx="0" cy="0"/>
+          <a:chOff x="0" y="0"/>
+          <a:chExt cx="0" cy="0"/>
+        </a:xfrm>
+      </p:grpSpPr>
+      <p:pic>
+        <p:nvPicPr>
+          <p:cNvPr id="13" name="Graphic 12" descr="Television">
+            <a:extLst>
+              <a:ext uri="{FF2B5EF4-FFF2-40B4-BE49-F238E27FC236}">
+                <a16:creationId xmlns:a16="http://schemas.microsoft.com/office/drawing/2014/main" id="{16AB0966-491A-4D81-8864-760FE2371DB4}"/>
+              </a:ext>
+            </a:extLst>
+          </p:cNvPr>
+          <p:cNvPicPr>
+            <a:picLocks noChangeAspect="1"/>
+          </p:cNvPicPr>
+          <p:nvPr/>
+        </p:nvPicPr>
+        <p:blipFill>
+          <a:blip r:embed="rId3">
+            <a:extLst>
+              <a:ext uri="{96DAC541-7B7A-43D3-8B79-37D633B846F1}">
+                <asvg:svgBlip xmlns:asvg="http://schemas.microsoft.com/office/drawing/2016/SVG/main" r:embed="rId4"/>
+              </a:ext>
+            </a:extLst>
+          </a:blip>
+          <a:stretch>
+            <a:fillRect/>
+          </a:stretch>
+        </p:blipFill>
+        <p:spPr>
+          <a:xfrm>
+            <a:off x="6221426" y="313982"/>
+            <a:ext cx="1762207" cy="2012136"/>
+          </a:xfrm>
+          <a:prstGeom prst="rect">
+            <a:avLst/>
+          </a:prstGeom>
+        </p:spPr>
+      </p:pic>
+      <p:cxnSp>
+        <p:nvCxnSpPr>
+          <p:cNvPr id="52" name="Straight Arrow Connector 51">
+            <a:extLst>
+              <a:ext uri="{FF2B5EF4-FFF2-40B4-BE49-F238E27FC236}">
+                <a16:creationId xmlns:a16="http://schemas.microsoft.com/office/drawing/2014/main" id="{A6CAFBE2-6941-419E-BD13-072D41AE4977}"/>
+              </a:ext>
+            </a:extLst>
+          </p:cNvPr>
+          <p:cNvCxnSpPr>
+            <a:cxnSpLocks/>
+          </p:cNvCxnSpPr>
+          <p:nvPr/>
+        </p:nvCxnSpPr>
+        <p:spPr>
+          <a:xfrm flipV="1">
+            <a:off x="5825890" y="1093622"/>
+            <a:ext cx="395536" cy="4082"/>
+          </a:xfrm>
+          <a:prstGeom prst="straightConnector1">
+            <a:avLst/>
+          </a:prstGeom>
+          <a:ln w="12700">
+            <a:solidFill>
+              <a:schemeClr val="tx1"/>
+            </a:solidFill>
+            <a:tailEnd type="triangle"/>
+          </a:ln>
+        </p:spPr>
+        <p:style>
+          <a:lnRef idx="1">
+            <a:schemeClr val="accent1"/>
+          </a:lnRef>
+          <a:fillRef idx="0">
+            <a:schemeClr val="accent1"/>
+          </a:fillRef>
+          <a:effectRef idx="0">
+            <a:schemeClr val="accent1"/>
+          </a:effectRef>
+          <a:fontRef idx="minor">
+            <a:schemeClr val="tx1"/>
+          </a:fontRef>
+        </p:style>
+      </p:cxnSp>
+      <p:sp>
+        <p:nvSpPr>
+          <p:cNvPr id="28" name="Rectangle 27">
+            <a:extLst>
+              <a:ext uri="{FF2B5EF4-FFF2-40B4-BE49-F238E27FC236}">
+                <a16:creationId xmlns:a16="http://schemas.microsoft.com/office/drawing/2014/main" id="{9D7D2546-66FE-44A4-B23B-E4A47B5744C6}"/>
+              </a:ext>
+            </a:extLst>
+          </p:cNvPr>
+          <p:cNvSpPr/>
+          <p:nvPr/>
+        </p:nvSpPr>
+        <p:spPr>
+          <a:xfrm>
+            <a:off x="3194950" y="1636511"/>
+            <a:ext cx="1096256" cy="517063"/>
+          </a:xfrm>
+          <a:prstGeom prst="rect">
+            <a:avLst/>
+          </a:prstGeom>
+          <a:solidFill>
+            <a:schemeClr val="bg1">
+              <a:lumMod val="60000"/>
+              <a:lumOff val="40000"/>
+            </a:schemeClr>
+          </a:solidFill>
+          <a:ln w="12700">
+            <a:solidFill>
+              <a:schemeClr val="bg2"/>
+            </a:solidFill>
+          </a:ln>
+        </p:spPr>
+        <p:style>
+          <a:lnRef idx="2">
+            <a:schemeClr val="accent1">
+              <a:shade val="50000"/>
+            </a:schemeClr>
+          </a:lnRef>
+          <a:fillRef idx="1">
+            <a:schemeClr val="accent1"/>
+          </a:fillRef>
+          <a:effectRef idx="0">
+            <a:schemeClr val="accent1"/>
+          </a:effectRef>
+          <a:fontRef idx="minor">
+            <a:schemeClr val="lt1"/>
+          </a:fontRef>
+        </p:style>
+        <p:txBody>
+          <a:bodyPr rtlCol="0" anchor="ctr"/>
+          <a:lstStyle/>
+          <a:p>
+            <a:pPr algn="ctr" defTabSz="914377" eaLnBrk="0" fontAlgn="base" hangingPunct="0">
+              <a:spcBef>
+                <a:spcPct val="0"/>
+              </a:spcBef>
+              <a:spcAft>
+                <a:spcPct val="0"/>
+              </a:spcAft>
+            </a:pPr>
+            <a:r>
+              <a:rPr lang="en-US" sz="1600" dirty="0">
+                <a:solidFill>
+                  <a:srgbClr val="000000"/>
+                </a:solidFill>
+                <a:latin typeface="Arial"/>
+              </a:rPr>
+              <a:t>Pravega</a:t>
+            </a:r>
+          </a:p>
+        </p:txBody>
+      </p:sp>
+      <p:sp>
+        <p:nvSpPr>
+          <p:cNvPr id="30" name="Rectangle 29">
+            <a:extLst>
+              <a:ext uri="{FF2B5EF4-FFF2-40B4-BE49-F238E27FC236}">
+                <a16:creationId xmlns:a16="http://schemas.microsoft.com/office/drawing/2014/main" id="{3D993EC3-53F6-4670-B05D-39E51E5D0BFD}"/>
+              </a:ext>
+            </a:extLst>
+          </p:cNvPr>
+          <p:cNvSpPr/>
+          <p:nvPr/>
+        </p:nvSpPr>
+        <p:spPr>
+          <a:xfrm>
+            <a:off x="3194950" y="2451437"/>
+            <a:ext cx="1096256" cy="517063"/>
+          </a:xfrm>
+          <a:prstGeom prst="rect">
+            <a:avLst/>
+          </a:prstGeom>
+          <a:solidFill>
+            <a:schemeClr val="tx1">
+              <a:lumMod val="20000"/>
+              <a:lumOff val="80000"/>
+            </a:schemeClr>
+          </a:solidFill>
+          <a:ln w="12700">
+            <a:solidFill>
+              <a:schemeClr val="bg2"/>
+            </a:solidFill>
+          </a:ln>
+        </p:spPr>
+        <p:style>
+          <a:lnRef idx="2">
+            <a:schemeClr val="accent1">
+              <a:shade val="50000"/>
+            </a:schemeClr>
+          </a:lnRef>
+          <a:fillRef idx="1">
+            <a:schemeClr val="accent1"/>
+          </a:fillRef>
+          <a:effectRef idx="0">
+            <a:schemeClr val="accent1"/>
+          </a:effectRef>
+          <a:fontRef idx="minor">
+            <a:schemeClr val="lt1"/>
+          </a:fontRef>
+        </p:style>
+        <p:txBody>
+          <a:bodyPr rtlCol="0" anchor="ctr"/>
+          <a:lstStyle/>
+          <a:p>
+            <a:pPr algn="ctr" defTabSz="914377" eaLnBrk="0" fontAlgn="base" hangingPunct="0">
+              <a:spcBef>
+                <a:spcPct val="0"/>
+              </a:spcBef>
+              <a:spcAft>
+                <a:spcPct val="0"/>
+              </a:spcAft>
+            </a:pPr>
+            <a:r>
+              <a:rPr lang="en-US" sz="1600" dirty="0">
+                <a:solidFill>
+                  <a:srgbClr val="000000"/>
+                </a:solidFill>
+                <a:latin typeface="Arial"/>
+              </a:rPr>
+              <a:t>Tier 2</a:t>
+            </a:r>
+          </a:p>
+        </p:txBody>
+      </p:sp>
+      <p:sp>
+        <p:nvSpPr>
+          <p:cNvPr id="33" name="Rectangle 32">
+            <a:extLst>
+              <a:ext uri="{FF2B5EF4-FFF2-40B4-BE49-F238E27FC236}">
+                <a16:creationId xmlns:a16="http://schemas.microsoft.com/office/drawing/2014/main" id="{44487C7D-B46D-455E-BC99-11EF779EEBA0}"/>
+              </a:ext>
+            </a:extLst>
+          </p:cNvPr>
+          <p:cNvSpPr/>
+          <p:nvPr/>
+        </p:nvSpPr>
+        <p:spPr>
+          <a:xfrm>
+            <a:off x="4729634" y="830469"/>
+            <a:ext cx="1096256" cy="517063"/>
+          </a:xfrm>
+          <a:prstGeom prst="rect">
+            <a:avLst/>
+          </a:prstGeom>
+          <a:solidFill>
+            <a:srgbClr val="92D050"/>
+          </a:solidFill>
+          <a:ln w="12700">
+            <a:solidFill>
+              <a:schemeClr val="bg2"/>
+            </a:solidFill>
+          </a:ln>
+        </p:spPr>
+        <p:style>
+          <a:lnRef idx="2">
+            <a:schemeClr val="accent1">
+              <a:shade val="50000"/>
+            </a:schemeClr>
+          </a:lnRef>
+          <a:fillRef idx="1">
+            <a:schemeClr val="accent1"/>
+          </a:fillRef>
+          <a:effectRef idx="0">
+            <a:schemeClr val="accent1"/>
+          </a:effectRef>
+          <a:fontRef idx="minor">
+            <a:schemeClr val="lt1"/>
+          </a:fontRef>
+        </p:style>
+        <p:txBody>
+          <a:bodyPr rtlCol="0" anchor="ctr"/>
+          <a:lstStyle/>
+          <a:p>
+            <a:pPr algn="ctr" defTabSz="914377" eaLnBrk="0" fontAlgn="base" hangingPunct="0">
+              <a:spcBef>
+                <a:spcPct val="0"/>
+              </a:spcBef>
+              <a:spcAft>
+                <a:spcPct val="0"/>
+              </a:spcAft>
+            </a:pPr>
+            <a:r>
+              <a:rPr lang="en-US" sz="1100" dirty="0">
+                <a:solidFill>
+                  <a:srgbClr val="000000"/>
+                </a:solidFill>
+                <a:latin typeface="Arial"/>
+              </a:rPr>
+              <a:t>Jupyter Notebook Server</a:t>
+            </a:r>
+          </a:p>
+        </p:txBody>
+      </p:sp>
+      <p:cxnSp>
+        <p:nvCxnSpPr>
+          <p:cNvPr id="35" name="Straight Arrow Connector 34">
+            <a:extLst>
+              <a:ext uri="{FF2B5EF4-FFF2-40B4-BE49-F238E27FC236}">
+                <a16:creationId xmlns:a16="http://schemas.microsoft.com/office/drawing/2014/main" id="{46CCF498-CB2C-4C06-B545-D68B057C36CC}"/>
+              </a:ext>
+            </a:extLst>
+          </p:cNvPr>
+          <p:cNvCxnSpPr>
+            <a:cxnSpLocks/>
+          </p:cNvCxnSpPr>
+          <p:nvPr/>
+        </p:nvCxnSpPr>
+        <p:spPr>
+          <a:xfrm>
+            <a:off x="1089980" y="669180"/>
+            <a:ext cx="393115" cy="0"/>
+          </a:xfrm>
+          <a:prstGeom prst="straightConnector1">
+            <a:avLst/>
+          </a:prstGeom>
+          <a:ln w="12700">
+            <a:solidFill>
+              <a:schemeClr val="tx1"/>
+            </a:solidFill>
+            <a:tailEnd type="triangle"/>
+          </a:ln>
+        </p:spPr>
+        <p:style>
+          <a:lnRef idx="1">
+            <a:schemeClr val="accent1"/>
+          </a:lnRef>
+          <a:fillRef idx="0">
+            <a:schemeClr val="accent1"/>
+          </a:fillRef>
+          <a:effectRef idx="0">
+            <a:schemeClr val="accent1"/>
+          </a:effectRef>
+          <a:fontRef idx="minor">
+            <a:schemeClr val="tx1"/>
+          </a:fontRef>
+        </p:style>
+      </p:cxnSp>
+      <p:pic>
+        <p:nvPicPr>
+          <p:cNvPr id="36" name="Content Placeholder 4" descr="Web cam">
+            <a:extLst>
+              <a:ext uri="{FF2B5EF4-FFF2-40B4-BE49-F238E27FC236}">
+                <a16:creationId xmlns:a16="http://schemas.microsoft.com/office/drawing/2014/main" id="{021B0FDB-BD35-4AC8-B4E1-4AD0CB9D7FF4}"/>
+              </a:ext>
+            </a:extLst>
+          </p:cNvPr>
+          <p:cNvPicPr>
+            <a:picLocks noChangeAspect="1"/>
+          </p:cNvPicPr>
+          <p:nvPr/>
+        </p:nvPicPr>
+        <p:blipFill>
+          <a:blip r:embed="rId5">
+            <a:extLst>
+              <a:ext uri="{96DAC541-7B7A-43D3-8B79-37D633B846F1}">
+                <asvg:svgBlip xmlns:asvg="http://schemas.microsoft.com/office/drawing/2016/SVG/main" r:embed="rId6"/>
+              </a:ext>
+            </a:extLst>
+          </a:blip>
+          <a:stretch>
+            <a:fillRect/>
+          </a:stretch>
+        </p:blipFill>
+        <p:spPr>
+          <a:xfrm>
+            <a:off x="595001" y="258670"/>
+            <a:ext cx="742791" cy="742791"/>
+          </a:xfrm>
+          <a:prstGeom prst="rect">
+            <a:avLst/>
+          </a:prstGeom>
+        </p:spPr>
+      </p:pic>
+      <p:cxnSp>
+        <p:nvCxnSpPr>
+          <p:cNvPr id="39" name="Straight Arrow Connector 38">
+            <a:extLst>
+              <a:ext uri="{FF2B5EF4-FFF2-40B4-BE49-F238E27FC236}">
+                <a16:creationId xmlns:a16="http://schemas.microsoft.com/office/drawing/2014/main" id="{767BA6BA-68BA-4E9E-8959-31D1C3DEFC1E}"/>
+              </a:ext>
+            </a:extLst>
+          </p:cNvPr>
+          <p:cNvCxnSpPr>
+            <a:cxnSpLocks/>
+          </p:cNvCxnSpPr>
+          <p:nvPr/>
+        </p:nvCxnSpPr>
+        <p:spPr>
+          <a:xfrm>
+            <a:off x="2085705" y="669181"/>
+            <a:ext cx="1094467" cy="284576"/>
+          </a:xfrm>
+          <a:prstGeom prst="straightConnector1">
+            <a:avLst/>
+          </a:prstGeom>
+          <a:ln w="12700">
+            <a:solidFill>
+              <a:schemeClr val="tx1"/>
+            </a:solidFill>
+            <a:tailEnd type="triangle"/>
+          </a:ln>
+        </p:spPr>
+        <p:style>
+          <a:lnRef idx="1">
+            <a:schemeClr val="accent1"/>
+          </a:lnRef>
+          <a:fillRef idx="0">
+            <a:schemeClr val="accent1"/>
+          </a:fillRef>
+          <a:effectRef idx="0">
+            <a:schemeClr val="accent1"/>
+          </a:effectRef>
+          <a:fontRef idx="minor">
+            <a:schemeClr val="tx1"/>
+          </a:fontRef>
+        </p:style>
+      </p:cxnSp>
+      <p:cxnSp>
+        <p:nvCxnSpPr>
+          <p:cNvPr id="40" name="Straight Arrow Connector 39">
+            <a:extLst>
+              <a:ext uri="{FF2B5EF4-FFF2-40B4-BE49-F238E27FC236}">
+                <a16:creationId xmlns:a16="http://schemas.microsoft.com/office/drawing/2014/main" id="{A6FC88B4-C092-40D0-AE0A-D599F0DF9B18}"/>
+              </a:ext>
+            </a:extLst>
+          </p:cNvPr>
+          <p:cNvCxnSpPr>
+            <a:cxnSpLocks/>
+          </p:cNvCxnSpPr>
+          <p:nvPr/>
+        </p:nvCxnSpPr>
+        <p:spPr>
+          <a:xfrm>
+            <a:off x="1089063" y="1441561"/>
+            <a:ext cx="393115" cy="0"/>
+          </a:xfrm>
+          <a:prstGeom prst="straightConnector1">
+            <a:avLst/>
+          </a:prstGeom>
+          <a:ln w="12700">
+            <a:solidFill>
+              <a:schemeClr val="tx1"/>
+            </a:solidFill>
+            <a:tailEnd type="triangle"/>
+          </a:ln>
+        </p:spPr>
+        <p:style>
+          <a:lnRef idx="1">
+            <a:schemeClr val="accent1"/>
+          </a:lnRef>
+          <a:fillRef idx="0">
+            <a:schemeClr val="accent1"/>
+          </a:fillRef>
+          <a:effectRef idx="0">
+            <a:schemeClr val="accent1"/>
+          </a:effectRef>
+          <a:fontRef idx="minor">
+            <a:schemeClr val="tx1"/>
+          </a:fontRef>
+        </p:style>
+      </p:cxnSp>
+      <p:pic>
+        <p:nvPicPr>
+          <p:cNvPr id="41" name="Content Placeholder 4" descr="Web cam">
+            <a:extLst>
+              <a:ext uri="{FF2B5EF4-FFF2-40B4-BE49-F238E27FC236}">
+                <a16:creationId xmlns:a16="http://schemas.microsoft.com/office/drawing/2014/main" id="{C0C19D2F-BAC2-4638-8F22-B57DF0993AB3}"/>
+              </a:ext>
+            </a:extLst>
+          </p:cNvPr>
+          <p:cNvPicPr>
+            <a:picLocks noChangeAspect="1"/>
+          </p:cNvPicPr>
+          <p:nvPr/>
+        </p:nvPicPr>
+        <p:blipFill>
+          <a:blip r:embed="rId5">
+            <a:extLst>
+              <a:ext uri="{96DAC541-7B7A-43D3-8B79-37D633B846F1}">
+                <asvg:svgBlip xmlns:asvg="http://schemas.microsoft.com/office/drawing/2016/SVG/main" r:embed="rId6"/>
+              </a:ext>
+            </a:extLst>
+          </a:blip>
+          <a:stretch>
+            <a:fillRect/>
+          </a:stretch>
+        </p:blipFill>
+        <p:spPr>
+          <a:xfrm>
+            <a:off x="594084" y="1031051"/>
+            <a:ext cx="742791" cy="742791"/>
+          </a:xfrm>
+          <a:prstGeom prst="rect">
+            <a:avLst/>
+          </a:prstGeom>
+        </p:spPr>
+      </p:pic>
+      <p:cxnSp>
+        <p:nvCxnSpPr>
+          <p:cNvPr id="44" name="Straight Arrow Connector 43">
+            <a:extLst>
+              <a:ext uri="{FF2B5EF4-FFF2-40B4-BE49-F238E27FC236}">
+                <a16:creationId xmlns:a16="http://schemas.microsoft.com/office/drawing/2014/main" id="{B813FD79-78FB-4A59-99D1-95C3CEBB1730}"/>
+              </a:ext>
+            </a:extLst>
+          </p:cNvPr>
+          <p:cNvCxnSpPr>
+            <a:cxnSpLocks/>
+            <a:endCxn id="45" idx="1"/>
+          </p:cNvCxnSpPr>
+          <p:nvPr/>
+        </p:nvCxnSpPr>
+        <p:spPr>
+          <a:xfrm flipV="1">
+            <a:off x="2084788" y="1089001"/>
+            <a:ext cx="1110162" cy="352561"/>
+          </a:xfrm>
+          <a:prstGeom prst="straightConnector1">
+            <a:avLst/>
+          </a:prstGeom>
+          <a:ln w="12700">
+            <a:solidFill>
+              <a:schemeClr val="tx1"/>
+            </a:solidFill>
+            <a:tailEnd type="triangle"/>
+          </a:ln>
+        </p:spPr>
+        <p:style>
+          <a:lnRef idx="1">
+            <a:schemeClr val="accent1"/>
+          </a:lnRef>
+          <a:fillRef idx="0">
+            <a:schemeClr val="accent1"/>
+          </a:fillRef>
+          <a:effectRef idx="0">
+            <a:schemeClr val="accent1"/>
+          </a:effectRef>
+          <a:fontRef idx="minor">
+            <a:schemeClr val="tx1"/>
+          </a:fontRef>
+        </p:style>
+      </p:cxnSp>
+      <p:sp>
+        <p:nvSpPr>
+          <p:cNvPr id="45" name="Rectangle 44">
+            <a:extLst>
+              <a:ext uri="{FF2B5EF4-FFF2-40B4-BE49-F238E27FC236}">
+                <a16:creationId xmlns:a16="http://schemas.microsoft.com/office/drawing/2014/main" id="{462DEF5E-B2ED-4FB7-B829-75B67DB79AEE}"/>
+              </a:ext>
+            </a:extLst>
+          </p:cNvPr>
+          <p:cNvSpPr/>
+          <p:nvPr/>
+        </p:nvSpPr>
+        <p:spPr>
+          <a:xfrm>
+            <a:off x="3194950" y="830469"/>
+            <a:ext cx="1096256" cy="517063"/>
+          </a:xfrm>
+          <a:prstGeom prst="rect">
+            <a:avLst/>
+          </a:prstGeom>
+          <a:solidFill>
+            <a:srgbClr val="92D050"/>
+          </a:solidFill>
+          <a:ln w="12700">
+            <a:solidFill>
+              <a:schemeClr val="bg2"/>
+            </a:solidFill>
+          </a:ln>
+        </p:spPr>
+        <p:style>
+          <a:lnRef idx="2">
+            <a:schemeClr val="accent1">
+              <a:shade val="50000"/>
+            </a:schemeClr>
+          </a:lnRef>
+          <a:fillRef idx="1">
+            <a:schemeClr val="accent1"/>
+          </a:fillRef>
+          <a:effectRef idx="0">
+            <a:schemeClr val="accent1"/>
+          </a:effectRef>
+          <a:fontRef idx="minor">
+            <a:schemeClr val="lt1"/>
+          </a:fontRef>
+        </p:style>
+        <p:txBody>
+          <a:bodyPr rtlCol="0" anchor="ctr"/>
+          <a:lstStyle/>
+          <a:p>
+            <a:pPr algn="ctr" defTabSz="914377" eaLnBrk="0" fontAlgn="base" hangingPunct="0">
+              <a:spcBef>
+                <a:spcPct val="0"/>
+              </a:spcBef>
+              <a:spcAft>
+                <a:spcPct val="0"/>
+              </a:spcAft>
+            </a:pPr>
+            <a:r>
+              <a:rPr lang="en-US" sz="1100" dirty="0">
+                <a:solidFill>
+                  <a:srgbClr val="000000"/>
+                </a:solidFill>
+                <a:latin typeface="Arial"/>
+              </a:rPr>
+              <a:t>Pravega GRPC Gateway</a:t>
+            </a:r>
+          </a:p>
+        </p:txBody>
+      </p:sp>
+      <p:sp>
+        <p:nvSpPr>
+          <p:cNvPr id="20" name="Rectangle: Rounded Corners 19">
+            <a:extLst>
+              <a:ext uri="{FF2B5EF4-FFF2-40B4-BE49-F238E27FC236}">
+                <a16:creationId xmlns:a16="http://schemas.microsoft.com/office/drawing/2014/main" id="{F43BEB64-7E32-4F39-8E23-B89174B7E2E0}"/>
+              </a:ext>
+            </a:extLst>
+          </p:cNvPr>
+          <p:cNvSpPr/>
+          <p:nvPr/>
+        </p:nvSpPr>
+        <p:spPr>
+          <a:xfrm>
+            <a:off x="536476" y="234129"/>
+            <a:ext cx="1778921" cy="2649544"/>
+          </a:xfrm>
+          <a:prstGeom prst="roundRect">
+            <a:avLst/>
+          </a:prstGeom>
+          <a:noFill/>
+          <a:ln w="12700">
+            <a:solidFill>
+              <a:schemeClr val="bg2"/>
+            </a:solidFill>
+            <a:prstDash val="dash"/>
+          </a:ln>
+        </p:spPr>
+        <p:style>
+          <a:lnRef idx="2">
+            <a:schemeClr val="accent1">
+              <a:shade val="50000"/>
+            </a:schemeClr>
+          </a:lnRef>
+          <a:fillRef idx="1">
+            <a:schemeClr val="accent1"/>
+          </a:fillRef>
+          <a:effectRef idx="0">
+            <a:schemeClr val="accent1"/>
+          </a:effectRef>
+          <a:fontRef idx="minor">
+            <a:schemeClr val="lt1"/>
+          </a:fontRef>
+        </p:style>
+        <p:txBody>
+          <a:bodyPr rtlCol="0" anchor="ctr"/>
+          <a:lstStyle/>
+          <a:p>
+            <a:pPr algn="ctr"/>
+            <a:endParaRPr lang="en-US" sz="1200" dirty="0">
+              <a:solidFill>
+                <a:schemeClr val="bg2"/>
+              </a:solidFill>
+            </a:endParaRPr>
+          </a:p>
+        </p:txBody>
+      </p:sp>
+      <p:sp>
+        <p:nvSpPr>
+          <p:cNvPr id="22" name="TextBox 21">
+            <a:extLst>
+              <a:ext uri="{FF2B5EF4-FFF2-40B4-BE49-F238E27FC236}">
+                <a16:creationId xmlns:a16="http://schemas.microsoft.com/office/drawing/2014/main" id="{7D30504B-F92B-4CCE-8AD3-07B6C15533E7}"/>
+              </a:ext>
+            </a:extLst>
+          </p:cNvPr>
+          <p:cNvSpPr txBox="1"/>
+          <p:nvPr/>
+        </p:nvSpPr>
+        <p:spPr>
+          <a:xfrm>
+            <a:off x="830065" y="2655321"/>
+            <a:ext cx="1170382" cy="184666"/>
+          </a:xfrm>
+          <a:prstGeom prst="rect">
+            <a:avLst/>
+          </a:prstGeom>
+          <a:noFill/>
+        </p:spPr>
+        <p:txBody>
+          <a:bodyPr wrap="square" lIns="0" tIns="0" rIns="0" bIns="0" rtlCol="0">
+            <a:spAutoFit/>
+          </a:bodyPr>
+          <a:lstStyle/>
+          <a:p>
+            <a:pPr algn="ctr"/>
+            <a:r>
+              <a:rPr lang="en-US" sz="1200" dirty="0"/>
+              <a:t>(simulated)</a:t>
+            </a:r>
+          </a:p>
+        </p:txBody>
+      </p:sp>
+      <p:cxnSp>
+        <p:nvCxnSpPr>
+          <p:cNvPr id="50" name="Straight Arrow Connector 49">
+            <a:extLst>
+              <a:ext uri="{FF2B5EF4-FFF2-40B4-BE49-F238E27FC236}">
+                <a16:creationId xmlns:a16="http://schemas.microsoft.com/office/drawing/2014/main" id="{E87F49DA-604B-4015-9DE0-C088DD2D14AE}"/>
+              </a:ext>
+            </a:extLst>
+          </p:cNvPr>
+          <p:cNvCxnSpPr>
+            <a:cxnSpLocks/>
+          </p:cNvCxnSpPr>
+          <p:nvPr/>
+        </p:nvCxnSpPr>
+        <p:spPr>
+          <a:xfrm>
+            <a:off x="3483429" y="1347532"/>
+            <a:ext cx="0" cy="288978"/>
+          </a:xfrm>
+          <a:prstGeom prst="straightConnector1">
+            <a:avLst/>
+          </a:prstGeom>
+          <a:ln w="12700">
+            <a:solidFill>
+              <a:schemeClr val="tx1"/>
+            </a:solidFill>
+            <a:tailEnd type="triangle"/>
+          </a:ln>
+        </p:spPr>
+        <p:style>
+          <a:lnRef idx="1">
+            <a:schemeClr val="accent1"/>
+          </a:lnRef>
+          <a:fillRef idx="0">
+            <a:schemeClr val="accent1"/>
+          </a:fillRef>
+          <a:effectRef idx="0">
+            <a:schemeClr val="accent1"/>
+          </a:effectRef>
+          <a:fontRef idx="minor">
+            <a:schemeClr val="tx1"/>
+          </a:fontRef>
+        </p:style>
+      </p:cxnSp>
+      <p:cxnSp>
+        <p:nvCxnSpPr>
+          <p:cNvPr id="53" name="Straight Arrow Connector 52">
+            <a:extLst>
+              <a:ext uri="{FF2B5EF4-FFF2-40B4-BE49-F238E27FC236}">
+                <a16:creationId xmlns:a16="http://schemas.microsoft.com/office/drawing/2014/main" id="{CA561896-A76A-4093-AD2A-1D6ED8F21727}"/>
+              </a:ext>
+            </a:extLst>
+          </p:cNvPr>
+          <p:cNvCxnSpPr>
+            <a:cxnSpLocks/>
+          </p:cNvCxnSpPr>
+          <p:nvPr/>
+        </p:nvCxnSpPr>
+        <p:spPr>
+          <a:xfrm>
+            <a:off x="3483429" y="2162459"/>
+            <a:ext cx="0" cy="288978"/>
+          </a:xfrm>
+          <a:prstGeom prst="straightConnector1">
+            <a:avLst/>
+          </a:prstGeom>
+          <a:ln w="12700">
+            <a:solidFill>
+              <a:schemeClr val="tx1"/>
+            </a:solidFill>
+            <a:tailEnd type="triangle"/>
+          </a:ln>
+        </p:spPr>
+        <p:style>
+          <a:lnRef idx="1">
+            <a:schemeClr val="accent1"/>
+          </a:lnRef>
+          <a:fillRef idx="0">
+            <a:schemeClr val="accent1"/>
+          </a:fillRef>
+          <a:effectRef idx="0">
+            <a:schemeClr val="accent1"/>
+          </a:effectRef>
+          <a:fontRef idx="minor">
+            <a:schemeClr val="tx1"/>
+          </a:fontRef>
+        </p:style>
+      </p:cxnSp>
+      <p:cxnSp>
+        <p:nvCxnSpPr>
+          <p:cNvPr id="54" name="Straight Arrow Connector 53">
+            <a:extLst>
+              <a:ext uri="{FF2B5EF4-FFF2-40B4-BE49-F238E27FC236}">
+                <a16:creationId xmlns:a16="http://schemas.microsoft.com/office/drawing/2014/main" id="{9C9B197E-C002-4E58-A735-2D80C1FB2AF0}"/>
+              </a:ext>
+            </a:extLst>
+          </p:cNvPr>
+          <p:cNvCxnSpPr>
+            <a:cxnSpLocks/>
+          </p:cNvCxnSpPr>
+          <p:nvPr/>
+        </p:nvCxnSpPr>
+        <p:spPr>
+          <a:xfrm flipV="1">
+            <a:off x="3966754" y="2153574"/>
+            <a:ext cx="0" cy="297863"/>
+          </a:xfrm>
+          <a:prstGeom prst="straightConnector1">
+            <a:avLst/>
+          </a:prstGeom>
+          <a:ln w="12700">
+            <a:solidFill>
+              <a:schemeClr val="tx1"/>
+            </a:solidFill>
+            <a:tailEnd type="triangle"/>
+          </a:ln>
+        </p:spPr>
+        <p:style>
+          <a:lnRef idx="1">
+            <a:schemeClr val="accent1"/>
+          </a:lnRef>
+          <a:fillRef idx="0">
+            <a:schemeClr val="accent1"/>
+          </a:fillRef>
+          <a:effectRef idx="0">
+            <a:schemeClr val="accent1"/>
+          </a:effectRef>
+          <a:fontRef idx="minor">
+            <a:schemeClr val="tx1"/>
+          </a:fontRef>
+        </p:style>
+      </p:cxnSp>
+      <p:cxnSp>
+        <p:nvCxnSpPr>
+          <p:cNvPr id="57" name="Straight Arrow Connector 56">
+            <a:extLst>
+              <a:ext uri="{FF2B5EF4-FFF2-40B4-BE49-F238E27FC236}">
+                <a16:creationId xmlns:a16="http://schemas.microsoft.com/office/drawing/2014/main" id="{09103352-F671-46A6-AC1C-2BF5671230C6}"/>
+              </a:ext>
+            </a:extLst>
+          </p:cNvPr>
+          <p:cNvCxnSpPr>
+            <a:cxnSpLocks/>
+          </p:cNvCxnSpPr>
+          <p:nvPr/>
+        </p:nvCxnSpPr>
+        <p:spPr>
+          <a:xfrm flipV="1">
+            <a:off x="3966754" y="1347532"/>
+            <a:ext cx="0" cy="297863"/>
+          </a:xfrm>
+          <a:prstGeom prst="straightConnector1">
+            <a:avLst/>
+          </a:prstGeom>
+          <a:ln w="12700">
+            <a:solidFill>
+              <a:schemeClr val="tx1"/>
+            </a:solidFill>
+            <a:tailEnd type="triangle"/>
+          </a:ln>
+        </p:spPr>
+        <p:style>
+          <a:lnRef idx="1">
+            <a:schemeClr val="accent1"/>
+          </a:lnRef>
+          <a:fillRef idx="0">
+            <a:schemeClr val="accent1"/>
+          </a:fillRef>
+          <a:effectRef idx="0">
+            <a:schemeClr val="accent1"/>
+          </a:effectRef>
+          <a:fontRef idx="minor">
+            <a:schemeClr val="tx1"/>
+          </a:fontRef>
+        </p:style>
+      </p:cxnSp>
+      <p:cxnSp>
+        <p:nvCxnSpPr>
+          <p:cNvPr id="58" name="Straight Arrow Connector 57">
+            <a:extLst>
+              <a:ext uri="{FF2B5EF4-FFF2-40B4-BE49-F238E27FC236}">
+                <a16:creationId xmlns:a16="http://schemas.microsoft.com/office/drawing/2014/main" id="{B7D9A711-71EE-4F61-BEBD-740EA9CF8B17}"/>
+              </a:ext>
+            </a:extLst>
+          </p:cNvPr>
+          <p:cNvCxnSpPr>
+            <a:cxnSpLocks/>
+            <a:stCxn id="45" idx="3"/>
+            <a:endCxn id="33" idx="1"/>
+          </p:cNvCxnSpPr>
+          <p:nvPr/>
+        </p:nvCxnSpPr>
+        <p:spPr>
+          <a:xfrm>
+            <a:off x="4291206" y="1089001"/>
+            <a:ext cx="438428" cy="0"/>
+          </a:xfrm>
+          <a:prstGeom prst="straightConnector1">
+            <a:avLst/>
+          </a:prstGeom>
+          <a:ln w="12700">
+            <a:solidFill>
+              <a:schemeClr val="tx1"/>
+            </a:solidFill>
+            <a:tailEnd type="triangle"/>
+          </a:ln>
+        </p:spPr>
+        <p:style>
+          <a:lnRef idx="1">
+            <a:schemeClr val="accent1"/>
+          </a:lnRef>
+          <a:fillRef idx="0">
+            <a:schemeClr val="accent1"/>
+          </a:fillRef>
+          <a:effectRef idx="0">
+            <a:schemeClr val="accent1"/>
+          </a:effectRef>
+          <a:fontRef idx="minor">
+            <a:schemeClr val="tx1"/>
+          </a:fontRef>
+        </p:style>
+      </p:cxnSp>
+      <p:cxnSp>
+        <p:nvCxnSpPr>
+          <p:cNvPr id="69" name="Straight Arrow Connector 68">
+            <a:extLst>
+              <a:ext uri="{FF2B5EF4-FFF2-40B4-BE49-F238E27FC236}">
+                <a16:creationId xmlns:a16="http://schemas.microsoft.com/office/drawing/2014/main" id="{D6D6DC4F-1A9F-4321-9E95-EBC6C6149ED4}"/>
+              </a:ext>
+            </a:extLst>
+          </p:cNvPr>
+          <p:cNvCxnSpPr>
+            <a:cxnSpLocks/>
+          </p:cNvCxnSpPr>
+          <p:nvPr/>
+        </p:nvCxnSpPr>
+        <p:spPr>
+          <a:xfrm>
+            <a:off x="1089063" y="2217916"/>
+            <a:ext cx="393115" cy="0"/>
+          </a:xfrm>
+          <a:prstGeom prst="straightConnector1">
+            <a:avLst/>
+          </a:prstGeom>
+          <a:ln w="12700">
+            <a:solidFill>
+              <a:schemeClr val="tx1"/>
+            </a:solidFill>
+            <a:tailEnd type="triangle"/>
+          </a:ln>
+        </p:spPr>
+        <p:style>
+          <a:lnRef idx="1">
+            <a:schemeClr val="accent1"/>
+          </a:lnRef>
+          <a:fillRef idx="0">
+            <a:schemeClr val="accent1"/>
+          </a:fillRef>
+          <a:effectRef idx="0">
+            <a:schemeClr val="accent1"/>
+          </a:effectRef>
+          <a:fontRef idx="minor">
+            <a:schemeClr val="tx1"/>
+          </a:fontRef>
+        </p:style>
+      </p:cxnSp>
+      <p:pic>
+        <p:nvPicPr>
+          <p:cNvPr id="70" name="Content Placeholder 4" descr="Web cam">
+            <a:extLst>
+              <a:ext uri="{FF2B5EF4-FFF2-40B4-BE49-F238E27FC236}">
+                <a16:creationId xmlns:a16="http://schemas.microsoft.com/office/drawing/2014/main" id="{D21EE501-4F3E-46A5-AF91-56D38DE3FD52}"/>
+              </a:ext>
+            </a:extLst>
+          </p:cNvPr>
+          <p:cNvPicPr>
+            <a:picLocks noChangeAspect="1"/>
+          </p:cNvPicPr>
+          <p:nvPr/>
+        </p:nvPicPr>
+        <p:blipFill>
+          <a:blip r:embed="rId5">
+            <a:extLst>
+              <a:ext uri="{96DAC541-7B7A-43D3-8B79-37D633B846F1}">
+                <asvg:svgBlip xmlns:asvg="http://schemas.microsoft.com/office/drawing/2016/SVG/main" r:embed="rId6"/>
+              </a:ext>
+            </a:extLst>
+          </a:blip>
+          <a:stretch>
+            <a:fillRect/>
+          </a:stretch>
+        </p:blipFill>
+        <p:spPr>
+          <a:xfrm>
+            <a:off x="594084" y="1807406"/>
+            <a:ext cx="742791" cy="742791"/>
+          </a:xfrm>
+          <a:prstGeom prst="rect">
+            <a:avLst/>
+          </a:prstGeom>
+        </p:spPr>
+      </p:pic>
+      <p:cxnSp>
+        <p:nvCxnSpPr>
+          <p:cNvPr id="72" name="Straight Arrow Connector 71">
+            <a:extLst>
+              <a:ext uri="{FF2B5EF4-FFF2-40B4-BE49-F238E27FC236}">
+                <a16:creationId xmlns:a16="http://schemas.microsoft.com/office/drawing/2014/main" id="{B1292985-BF4E-4575-9ABB-29B253C19B04}"/>
+              </a:ext>
+            </a:extLst>
+          </p:cNvPr>
+          <p:cNvCxnSpPr>
+            <a:cxnSpLocks/>
+          </p:cNvCxnSpPr>
+          <p:nvPr/>
+        </p:nvCxnSpPr>
+        <p:spPr>
+          <a:xfrm flipV="1">
+            <a:off x="2084788" y="1255394"/>
+            <a:ext cx="1095384" cy="962523"/>
+          </a:xfrm>
+          <a:prstGeom prst="straightConnector1">
+            <a:avLst/>
+          </a:prstGeom>
+          <a:ln w="12700">
+            <a:solidFill>
+              <a:schemeClr val="tx1"/>
+            </a:solidFill>
+            <a:tailEnd type="triangle"/>
+          </a:ln>
+        </p:spPr>
+        <p:style>
+          <a:lnRef idx="1">
+            <a:schemeClr val="accent1"/>
+          </a:lnRef>
+          <a:fillRef idx="0">
+            <a:schemeClr val="accent1"/>
+          </a:fillRef>
+          <a:effectRef idx="0">
+            <a:schemeClr val="accent1"/>
+          </a:effectRef>
+          <a:fontRef idx="minor">
+            <a:schemeClr val="tx1"/>
+          </a:fontRef>
+        </p:style>
+      </p:cxnSp>
+      <p:pic>
+        <p:nvPicPr>
+          <p:cNvPr id="77" name="Picture 76">
+            <a:extLst>
+              <a:ext uri="{FF2B5EF4-FFF2-40B4-BE49-F238E27FC236}">
+                <a16:creationId xmlns:a16="http://schemas.microsoft.com/office/drawing/2014/main" id="{AF5381E0-AD95-47D1-8C84-818462F0E234}"/>
+              </a:ext>
+            </a:extLst>
+          </p:cNvPr>
+          <p:cNvPicPr>
+            <a:picLocks noChangeAspect="1"/>
+          </p:cNvPicPr>
+          <p:nvPr/>
+        </p:nvPicPr>
+        <p:blipFill>
+          <a:blip r:embed="rId7"/>
+          <a:stretch>
+            <a:fillRect/>
+          </a:stretch>
+        </p:blipFill>
+        <p:spPr>
+          <a:xfrm>
+            <a:off x="1491768" y="1255394"/>
+            <a:ext cx="593019" cy="390525"/>
+          </a:xfrm>
+          <a:prstGeom prst="rect">
+            <a:avLst/>
+          </a:prstGeom>
+        </p:spPr>
+      </p:pic>
+      <p:pic>
+        <p:nvPicPr>
+          <p:cNvPr id="78" name="Picture 77">
+            <a:extLst>
+              <a:ext uri="{FF2B5EF4-FFF2-40B4-BE49-F238E27FC236}">
+                <a16:creationId xmlns:a16="http://schemas.microsoft.com/office/drawing/2014/main" id="{CFB09702-A91A-46E7-995E-87367C500535}"/>
+              </a:ext>
+            </a:extLst>
+          </p:cNvPr>
+          <p:cNvPicPr>
+            <a:picLocks noChangeAspect="1"/>
+          </p:cNvPicPr>
+          <p:nvPr/>
+        </p:nvPicPr>
+        <p:blipFill>
+          <a:blip r:embed="rId8"/>
+          <a:stretch>
+            <a:fillRect/>
+          </a:stretch>
+        </p:blipFill>
+        <p:spPr>
+          <a:xfrm>
+            <a:off x="1480866" y="2051252"/>
+            <a:ext cx="579581" cy="325379"/>
+          </a:xfrm>
+          <a:prstGeom prst="rect">
+            <a:avLst/>
+          </a:prstGeom>
+        </p:spPr>
+      </p:pic>
+      <p:pic>
+        <p:nvPicPr>
+          <p:cNvPr id="79" name="Picture 78">
+            <a:extLst>
+              <a:ext uri="{FF2B5EF4-FFF2-40B4-BE49-F238E27FC236}">
+                <a16:creationId xmlns:a16="http://schemas.microsoft.com/office/drawing/2014/main" id="{5D57D431-A135-4DA1-8F93-124F232598C1}"/>
+              </a:ext>
+            </a:extLst>
+          </p:cNvPr>
+          <p:cNvPicPr>
+            <a:picLocks noChangeAspect="1"/>
+          </p:cNvPicPr>
+          <p:nvPr/>
+        </p:nvPicPr>
+        <p:blipFill>
+          <a:blip r:embed="rId9"/>
+          <a:stretch>
+            <a:fillRect/>
+          </a:stretch>
+        </p:blipFill>
+        <p:spPr>
+          <a:xfrm>
+            <a:off x="1485858" y="484653"/>
+            <a:ext cx="569595" cy="390352"/>
+          </a:xfrm>
+          <a:prstGeom prst="rect">
+            <a:avLst/>
+          </a:prstGeom>
+        </p:spPr>
+      </p:pic>
+      <p:pic>
+        <p:nvPicPr>
+          <p:cNvPr id="81" name="Picture 80">
+            <a:extLst>
+              <a:ext uri="{FF2B5EF4-FFF2-40B4-BE49-F238E27FC236}">
+                <a16:creationId xmlns:a16="http://schemas.microsoft.com/office/drawing/2014/main" id="{99A5907A-EE8A-4F01-AA72-0326E225B5FF}"/>
+              </a:ext>
+            </a:extLst>
+          </p:cNvPr>
+          <p:cNvPicPr>
+            <a:picLocks noChangeAspect="1"/>
+          </p:cNvPicPr>
+          <p:nvPr/>
+        </p:nvPicPr>
+        <p:blipFill>
+          <a:blip r:embed="rId10"/>
+          <a:stretch>
+            <a:fillRect/>
+          </a:stretch>
+        </p:blipFill>
+        <p:spPr>
+          <a:xfrm>
+            <a:off x="6425958" y="769674"/>
+            <a:ext cx="1371057" cy="903083"/>
+          </a:xfrm>
+          <a:prstGeom prst="rect">
+            <a:avLst/>
+          </a:prstGeom>
+        </p:spPr>
+      </p:pic>
+    </p:spTree>
+    <p:extLst>
+      <p:ext uri="{BB962C8B-B14F-4D97-AF65-F5344CB8AC3E}">
+        <p14:creationId xmlns:p14="http://schemas.microsoft.com/office/powerpoint/2010/main" val="3997393023"/>
       </p:ext>
     </p:extLst>
   </p:cSld>

</xml_diff>

<commit_message>
Updated safety and security notebooks.
Signed-off-by: Claudio Fahey <claudio.fahey@dell.com>
</commit_message>
<xml_diff>
--- a/images/video-samples-diagram.pptx
+++ b/images/video-samples-diagram.pptx
@@ -6977,13 +6977,13 @@
               </a:spcAft>
             </a:pPr>
             <a:r>
-              <a:rPr lang="en-US" sz="1600" dirty="0">
+              <a:rPr lang="en-US" sz="1400" dirty="0">
                 <a:solidFill>
                   <a:srgbClr val="000000"/>
                 </a:solidFill>
                 <a:latin typeface="Arial"/>
               </a:rPr>
-              <a:t>Tier 2</a:t>
+              <a:t>Long Term Storage</a:t>
             </a:r>
           </a:p>
         </p:txBody>

</xml_diff>